<commit_message>
updated lecture 02 and deleted old one
</commit_message>
<xml_diff>
--- a/lectures/EEG 02 narrow.pptx
+++ b/lectures/EEG 02 narrow.pptx
@@ -337,7 +337,7 @@
             <a:fld id="{B61BEF0D-F0BB-DE4B-95CE-6DB70DBA9567}" type="datetimeFigureOut">
               <a:rPr lang="en-US" smtClean="0"/>
               <a:pPr/>
-              <a:t>5/11/2015</a:t>
+              <a:t>5/12/2015</a:t>
             </a:fld>
             <a:endParaRPr lang="en-US" dirty="0"/>
           </a:p>
@@ -671,7 +671,7 @@
             <a:fld id="{B61BEF0D-F0BB-DE4B-95CE-6DB70DBA9567}" type="datetimeFigureOut">
               <a:rPr lang="en-US" smtClean="0"/>
               <a:pPr/>
-              <a:t>5/11/2015</a:t>
+              <a:t>5/12/2015</a:t>
             </a:fld>
             <a:endParaRPr lang="en-US" dirty="0"/>
           </a:p>
@@ -1072,7 +1072,7 @@
             <a:fld id="{B61BEF0D-F0BB-DE4B-95CE-6DB70DBA9567}" type="datetimeFigureOut">
               <a:rPr lang="en-US" smtClean="0"/>
               <a:pPr/>
-              <a:t>5/11/2015</a:t>
+              <a:t>5/12/2015</a:t>
             </a:fld>
             <a:endParaRPr lang="en-US" dirty="0"/>
           </a:p>
@@ -1408,7 +1408,7 @@
             <a:fld id="{B61BEF0D-F0BB-DE4B-95CE-6DB70DBA9567}" type="datetimeFigureOut">
               <a:rPr lang="en-US" smtClean="0"/>
               <a:pPr/>
-              <a:t>5/11/2015</a:t>
+              <a:t>5/12/2015</a:t>
             </a:fld>
             <a:endParaRPr lang="en-US" dirty="0"/>
           </a:p>
@@ -1728,7 +1728,7 @@
             <a:fld id="{B61BEF0D-F0BB-DE4B-95CE-6DB70DBA9567}" type="datetimeFigureOut">
               <a:rPr lang="en-US" smtClean="0"/>
               <a:pPr/>
-              <a:t>5/11/2015</a:t>
+              <a:t>5/12/2015</a:t>
             </a:fld>
             <a:endParaRPr lang="en-US" dirty="0"/>
           </a:p>
@@ -2124,7 +2124,7 @@
             <a:fld id="{B61BEF0D-F0BB-DE4B-95CE-6DB70DBA9567}" type="datetimeFigureOut">
               <a:rPr lang="en-US" smtClean="0"/>
               <a:pPr/>
-              <a:t>5/11/2015</a:t>
+              <a:t>5/12/2015</a:t>
             </a:fld>
             <a:endParaRPr lang="en-US" dirty="0"/>
           </a:p>
@@ -2381,7 +2381,7 @@
             <a:fld id="{B61BEF0D-F0BB-DE4B-95CE-6DB70DBA9567}" type="datetimeFigureOut">
               <a:rPr lang="en-US" smtClean="0"/>
               <a:pPr/>
-              <a:t>5/11/2015</a:t>
+              <a:t>5/12/2015</a:t>
             </a:fld>
             <a:endParaRPr lang="en-US" dirty="0"/>
           </a:p>
@@ -2643,7 +2643,7 @@
             <a:fld id="{B61BEF0D-F0BB-DE4B-95CE-6DB70DBA9567}" type="datetimeFigureOut">
               <a:rPr lang="en-US" smtClean="0"/>
               <a:pPr/>
-              <a:t>5/11/2015</a:t>
+              <a:t>5/12/2015</a:t>
             </a:fld>
             <a:endParaRPr lang="en-US" dirty="0"/>
           </a:p>
@@ -2905,7 +2905,7 @@
             <a:fld id="{B61BEF0D-F0BB-DE4B-95CE-6DB70DBA9567}" type="datetimeFigureOut">
               <a:rPr lang="en-US" smtClean="0"/>
               <a:pPr/>
-              <a:t>5/11/2015</a:t>
+              <a:t>5/12/2015</a:t>
             </a:fld>
             <a:endParaRPr lang="en-US" dirty="0"/>
           </a:p>
@@ -3234,7 +3234,7 @@
             <a:fld id="{B61BEF0D-F0BB-DE4B-95CE-6DB70DBA9567}" type="datetimeFigureOut">
               <a:rPr lang="en-US" smtClean="0"/>
               <a:pPr/>
-              <a:t>5/11/2015</a:t>
+              <a:t>5/12/2015</a:t>
             </a:fld>
             <a:endParaRPr lang="en-US" dirty="0"/>
           </a:p>
@@ -3557,7 +3557,7 @@
             <a:fld id="{B61BEF0D-F0BB-DE4B-95CE-6DB70DBA9567}" type="datetimeFigureOut">
               <a:rPr lang="en-US" smtClean="0"/>
               <a:pPr/>
-              <a:t>5/11/2015</a:t>
+              <a:t>5/12/2015</a:t>
             </a:fld>
             <a:endParaRPr lang="en-US" dirty="0"/>
           </a:p>
@@ -4014,7 +4014,7 @@
             <a:fld id="{B61BEF0D-F0BB-DE4B-95CE-6DB70DBA9567}" type="datetimeFigureOut">
               <a:rPr lang="en-US" smtClean="0"/>
               <a:pPr/>
-              <a:t>5/11/2015</a:t>
+              <a:t>5/12/2015</a:t>
             </a:fld>
             <a:endParaRPr lang="en-US" dirty="0"/>
           </a:p>
@@ -4224,7 +4224,7 @@
             <a:fld id="{B61BEF0D-F0BB-DE4B-95CE-6DB70DBA9567}" type="datetimeFigureOut">
               <a:rPr lang="en-US" smtClean="0"/>
               <a:pPr/>
-              <a:t>5/11/2015</a:t>
+              <a:t>5/12/2015</a:t>
             </a:fld>
             <a:endParaRPr lang="en-US" dirty="0"/>
           </a:p>
@@ -4401,7 +4401,7 @@
             <a:fld id="{B61BEF0D-F0BB-DE4B-95CE-6DB70DBA9567}" type="datetimeFigureOut">
               <a:rPr lang="en-US" smtClean="0"/>
               <a:pPr/>
-              <a:t>5/11/2015</a:t>
+              <a:t>5/12/2015</a:t>
             </a:fld>
             <a:endParaRPr lang="en-US" dirty="0"/>
           </a:p>
@@ -4734,7 +4734,7 @@
             <a:fld id="{B61BEF0D-F0BB-DE4B-95CE-6DB70DBA9567}" type="datetimeFigureOut">
               <a:rPr lang="en-US" smtClean="0"/>
               <a:pPr/>
-              <a:t>5/11/2015</a:t>
+              <a:t>5/12/2015</a:t>
             </a:fld>
             <a:endParaRPr lang="en-US" dirty="0"/>
           </a:p>
@@ -5079,7 +5079,7 @@
             <a:fld id="{B61BEF0D-F0BB-DE4B-95CE-6DB70DBA9567}" type="datetimeFigureOut">
               <a:rPr lang="en-US" smtClean="0"/>
               <a:pPr/>
-              <a:t>5/11/2015</a:t>
+              <a:t>5/12/2015</a:t>
             </a:fld>
             <a:endParaRPr lang="en-US" dirty="0"/>
           </a:p>
@@ -7196,7 +7196,7 @@
             <a:fld id="{B61BEF0D-F0BB-DE4B-95CE-6DB70DBA9567}" type="datetimeFigureOut">
               <a:rPr lang="en-US" smtClean="0"/>
               <a:pPr/>
-              <a:t>5/11/2015</a:t>
+              <a:t>5/12/2015</a:t>
             </a:fld>
             <a:endParaRPr lang="en-US" dirty="0"/>
           </a:p>
@@ -8217,11 +8217,7 @@
           <a:p>
             <a:r>
               <a:rPr lang="pl-PL" dirty="0" smtClean="0"/>
-              <a:t>Wczytywanie informacj</a:t>
-            </a:r>
-            <a:r>
-              <a:rPr lang="pl-PL" dirty="0" smtClean="0"/>
-              <a:t>i o pozycji elektrod </a:t>
+              <a:t>Wczytywanie informacji o pozycji elektrod </a:t>
             </a:r>
             <a:r>
               <a:rPr lang="pl-PL" dirty="0" err="1" smtClean="0"/>
@@ -8450,6 +8446,30 @@
           </a:p>
         </p:txBody>
       </p:sp>
+      <p:pic>
+        <p:nvPicPr>
+          <p:cNvPr id="3" name="Obraz 2"/>
+          <p:cNvPicPr>
+            <a:picLocks noChangeAspect="1"/>
+          </p:cNvPicPr>
+          <p:nvPr/>
+        </p:nvPicPr>
+        <p:blipFill>
+          <a:blip r:embed="rId4"/>
+          <a:stretch>
+            <a:fillRect/>
+          </a:stretch>
+        </p:blipFill>
+        <p:spPr>
+          <a:xfrm>
+            <a:off x="2482135" y="1881654"/>
+            <a:ext cx="4845944" cy="4370407"/>
+          </a:xfrm>
+          <a:prstGeom prst="rect">
+            <a:avLst/>
+          </a:prstGeom>
+        </p:spPr>
+      </p:pic>
     </p:spTree>
     <p:extLst>
       <p:ext uri="{BB962C8B-B14F-4D97-AF65-F5344CB8AC3E}">
@@ -8940,9 +8960,795 @@
   <p:timing>
     <p:tnLst>
       <p:par>
-        <p:cTn id="1" dur="indefinite" restart="never" nodeType="tmRoot"/>
+        <p:cTn id="1" dur="indefinite" restart="never" nodeType="tmRoot">
+          <p:childTnLst>
+            <p:seq concurrent="1" nextAc="seek">
+              <p:cTn id="2" dur="indefinite" nodeType="mainSeq">
+                <p:childTnLst>
+                  <p:par>
+                    <p:cTn id="3" fill="hold">
+                      <p:stCondLst>
+                        <p:cond delay="indefinite"/>
+                      </p:stCondLst>
+                      <p:childTnLst>
+                        <p:par>
+                          <p:cTn id="4" fill="hold">
+                            <p:stCondLst>
+                              <p:cond delay="0"/>
+                            </p:stCondLst>
+                            <p:childTnLst>
+                              <p:par>
+                                <p:cTn id="5" presetID="53" presetClass="entr" presetSubtype="16" fill="hold" grpId="0" nodeType="clickEffect">
+                                  <p:stCondLst>
+                                    <p:cond delay="0"/>
+                                  </p:stCondLst>
+                                  <p:childTnLst>
+                                    <p:set>
+                                      <p:cBhvr>
+                                        <p:cTn id="6" dur="1" fill="hold">
+                                          <p:stCondLst>
+                                            <p:cond delay="0"/>
+                                          </p:stCondLst>
+                                        </p:cTn>
+                                        <p:tgtEl>
+                                          <p:spTgt spid="5"/>
+                                        </p:tgtEl>
+                                        <p:attrNameLst>
+                                          <p:attrName>style.visibility</p:attrName>
+                                        </p:attrNameLst>
+                                      </p:cBhvr>
+                                      <p:to>
+                                        <p:strVal val="visible"/>
+                                      </p:to>
+                                    </p:set>
+                                    <p:anim calcmode="lin" valueType="num">
+                                      <p:cBhvr>
+                                        <p:cTn id="7" dur="500" fill="hold"/>
+                                        <p:tgtEl>
+                                          <p:spTgt spid="5"/>
+                                        </p:tgtEl>
+                                        <p:attrNameLst>
+                                          <p:attrName>ppt_w</p:attrName>
+                                        </p:attrNameLst>
+                                      </p:cBhvr>
+                                      <p:tavLst>
+                                        <p:tav tm="0">
+                                          <p:val>
+                                            <p:fltVal val="0"/>
+                                          </p:val>
+                                        </p:tav>
+                                        <p:tav tm="100000">
+                                          <p:val>
+                                            <p:strVal val="#ppt_w"/>
+                                          </p:val>
+                                        </p:tav>
+                                      </p:tavLst>
+                                    </p:anim>
+                                    <p:anim calcmode="lin" valueType="num">
+                                      <p:cBhvr>
+                                        <p:cTn id="8" dur="500" fill="hold"/>
+                                        <p:tgtEl>
+                                          <p:spTgt spid="5"/>
+                                        </p:tgtEl>
+                                        <p:attrNameLst>
+                                          <p:attrName>ppt_h</p:attrName>
+                                        </p:attrNameLst>
+                                      </p:cBhvr>
+                                      <p:tavLst>
+                                        <p:tav tm="0">
+                                          <p:val>
+                                            <p:fltVal val="0"/>
+                                          </p:val>
+                                        </p:tav>
+                                        <p:tav tm="100000">
+                                          <p:val>
+                                            <p:strVal val="#ppt_h"/>
+                                          </p:val>
+                                        </p:tav>
+                                      </p:tavLst>
+                                    </p:anim>
+                                    <p:animEffect transition="in" filter="fade">
+                                      <p:cBhvr>
+                                        <p:cTn id="9" dur="500"/>
+                                        <p:tgtEl>
+                                          <p:spTgt spid="5"/>
+                                        </p:tgtEl>
+                                      </p:cBhvr>
+                                    </p:animEffect>
+                                  </p:childTnLst>
+                                </p:cTn>
+                              </p:par>
+                            </p:childTnLst>
+                          </p:cTn>
+                        </p:par>
+                        <p:par>
+                          <p:cTn id="10" fill="hold">
+                            <p:stCondLst>
+                              <p:cond delay="500"/>
+                            </p:stCondLst>
+                            <p:childTnLst>
+                              <p:par>
+                                <p:cTn id="11" presetID="22" presetClass="entr" presetSubtype="8" fill="hold" grpId="0" nodeType="afterEffect">
+                                  <p:stCondLst>
+                                    <p:cond delay="0"/>
+                                  </p:stCondLst>
+                                  <p:childTnLst>
+                                    <p:set>
+                                      <p:cBhvr>
+                                        <p:cTn id="12" dur="1" fill="hold">
+                                          <p:stCondLst>
+                                            <p:cond delay="0"/>
+                                          </p:stCondLst>
+                                        </p:cTn>
+                                        <p:tgtEl>
+                                          <p:spTgt spid="7">
+                                            <p:txEl>
+                                              <p:pRg st="0" end="0"/>
+                                            </p:txEl>
+                                          </p:spTgt>
+                                        </p:tgtEl>
+                                        <p:attrNameLst>
+                                          <p:attrName>style.visibility</p:attrName>
+                                        </p:attrNameLst>
+                                      </p:cBhvr>
+                                      <p:to>
+                                        <p:strVal val="visible"/>
+                                      </p:to>
+                                    </p:set>
+                                    <p:animEffect transition="in" filter="wipe(left)">
+                                      <p:cBhvr>
+                                        <p:cTn id="13" dur="500"/>
+                                        <p:tgtEl>
+                                          <p:spTgt spid="7">
+                                            <p:txEl>
+                                              <p:pRg st="0" end="0"/>
+                                            </p:txEl>
+                                          </p:spTgt>
+                                        </p:tgtEl>
+                                      </p:cBhvr>
+                                    </p:animEffect>
+                                  </p:childTnLst>
+                                </p:cTn>
+                              </p:par>
+                            </p:childTnLst>
+                          </p:cTn>
+                        </p:par>
+                      </p:childTnLst>
+                    </p:cTn>
+                  </p:par>
+                  <p:par>
+                    <p:cTn id="14" fill="hold">
+                      <p:stCondLst>
+                        <p:cond delay="indefinite"/>
+                      </p:stCondLst>
+                      <p:childTnLst>
+                        <p:par>
+                          <p:cTn id="15" fill="hold">
+                            <p:stCondLst>
+                              <p:cond delay="0"/>
+                            </p:stCondLst>
+                            <p:childTnLst>
+                              <p:par>
+                                <p:cTn id="16" presetID="53" presetClass="entr" presetSubtype="16" fill="hold" grpId="0" nodeType="clickEffect">
+                                  <p:stCondLst>
+                                    <p:cond delay="0"/>
+                                  </p:stCondLst>
+                                  <p:childTnLst>
+                                    <p:set>
+                                      <p:cBhvr>
+                                        <p:cTn id="17" dur="1" fill="hold">
+                                          <p:stCondLst>
+                                            <p:cond delay="0"/>
+                                          </p:stCondLst>
+                                        </p:cTn>
+                                        <p:tgtEl>
+                                          <p:spTgt spid="16"/>
+                                        </p:tgtEl>
+                                        <p:attrNameLst>
+                                          <p:attrName>style.visibility</p:attrName>
+                                        </p:attrNameLst>
+                                      </p:cBhvr>
+                                      <p:to>
+                                        <p:strVal val="visible"/>
+                                      </p:to>
+                                    </p:set>
+                                    <p:anim calcmode="lin" valueType="num">
+                                      <p:cBhvr>
+                                        <p:cTn id="18" dur="500" fill="hold"/>
+                                        <p:tgtEl>
+                                          <p:spTgt spid="16"/>
+                                        </p:tgtEl>
+                                        <p:attrNameLst>
+                                          <p:attrName>ppt_w</p:attrName>
+                                        </p:attrNameLst>
+                                      </p:cBhvr>
+                                      <p:tavLst>
+                                        <p:tav tm="0">
+                                          <p:val>
+                                            <p:fltVal val="0"/>
+                                          </p:val>
+                                        </p:tav>
+                                        <p:tav tm="100000">
+                                          <p:val>
+                                            <p:strVal val="#ppt_w"/>
+                                          </p:val>
+                                        </p:tav>
+                                      </p:tavLst>
+                                    </p:anim>
+                                    <p:anim calcmode="lin" valueType="num">
+                                      <p:cBhvr>
+                                        <p:cTn id="19" dur="500" fill="hold"/>
+                                        <p:tgtEl>
+                                          <p:spTgt spid="16"/>
+                                        </p:tgtEl>
+                                        <p:attrNameLst>
+                                          <p:attrName>ppt_h</p:attrName>
+                                        </p:attrNameLst>
+                                      </p:cBhvr>
+                                      <p:tavLst>
+                                        <p:tav tm="0">
+                                          <p:val>
+                                            <p:fltVal val="0"/>
+                                          </p:val>
+                                        </p:tav>
+                                        <p:tav tm="100000">
+                                          <p:val>
+                                            <p:strVal val="#ppt_h"/>
+                                          </p:val>
+                                        </p:tav>
+                                      </p:tavLst>
+                                    </p:anim>
+                                    <p:animEffect transition="in" filter="fade">
+                                      <p:cBhvr>
+                                        <p:cTn id="20" dur="500"/>
+                                        <p:tgtEl>
+                                          <p:spTgt spid="16"/>
+                                        </p:tgtEl>
+                                      </p:cBhvr>
+                                    </p:animEffect>
+                                  </p:childTnLst>
+                                </p:cTn>
+                              </p:par>
+                            </p:childTnLst>
+                          </p:cTn>
+                        </p:par>
+                        <p:par>
+                          <p:cTn id="21" fill="hold">
+                            <p:stCondLst>
+                              <p:cond delay="500"/>
+                            </p:stCondLst>
+                            <p:childTnLst>
+                              <p:par>
+                                <p:cTn id="22" presetID="22" presetClass="entr" presetSubtype="8" fill="hold" grpId="0" nodeType="afterEffect">
+                                  <p:stCondLst>
+                                    <p:cond delay="0"/>
+                                  </p:stCondLst>
+                                  <p:childTnLst>
+                                    <p:set>
+                                      <p:cBhvr>
+                                        <p:cTn id="23" dur="1" fill="hold">
+                                          <p:stCondLst>
+                                            <p:cond delay="0"/>
+                                          </p:stCondLst>
+                                        </p:cTn>
+                                        <p:tgtEl>
+                                          <p:spTgt spid="7">
+                                            <p:txEl>
+                                              <p:pRg st="1" end="1"/>
+                                            </p:txEl>
+                                          </p:spTgt>
+                                        </p:tgtEl>
+                                        <p:attrNameLst>
+                                          <p:attrName>style.visibility</p:attrName>
+                                        </p:attrNameLst>
+                                      </p:cBhvr>
+                                      <p:to>
+                                        <p:strVal val="visible"/>
+                                      </p:to>
+                                    </p:set>
+                                    <p:animEffect transition="in" filter="wipe(left)">
+                                      <p:cBhvr>
+                                        <p:cTn id="24" dur="500"/>
+                                        <p:tgtEl>
+                                          <p:spTgt spid="7">
+                                            <p:txEl>
+                                              <p:pRg st="1" end="1"/>
+                                            </p:txEl>
+                                          </p:spTgt>
+                                        </p:tgtEl>
+                                      </p:cBhvr>
+                                    </p:animEffect>
+                                  </p:childTnLst>
+                                </p:cTn>
+                              </p:par>
+                            </p:childTnLst>
+                          </p:cTn>
+                        </p:par>
+                      </p:childTnLst>
+                    </p:cTn>
+                  </p:par>
+                  <p:par>
+                    <p:cTn id="25" fill="hold">
+                      <p:stCondLst>
+                        <p:cond delay="indefinite"/>
+                      </p:stCondLst>
+                      <p:childTnLst>
+                        <p:par>
+                          <p:cTn id="26" fill="hold">
+                            <p:stCondLst>
+                              <p:cond delay="0"/>
+                            </p:stCondLst>
+                            <p:childTnLst>
+                              <p:par>
+                                <p:cTn id="27" presetID="53" presetClass="entr" presetSubtype="16" fill="hold" grpId="0" nodeType="clickEffect">
+                                  <p:stCondLst>
+                                    <p:cond delay="0"/>
+                                  </p:stCondLst>
+                                  <p:childTnLst>
+                                    <p:set>
+                                      <p:cBhvr>
+                                        <p:cTn id="28" dur="1" fill="hold">
+                                          <p:stCondLst>
+                                            <p:cond delay="0"/>
+                                          </p:stCondLst>
+                                        </p:cTn>
+                                        <p:tgtEl>
+                                          <p:spTgt spid="17"/>
+                                        </p:tgtEl>
+                                        <p:attrNameLst>
+                                          <p:attrName>style.visibility</p:attrName>
+                                        </p:attrNameLst>
+                                      </p:cBhvr>
+                                      <p:to>
+                                        <p:strVal val="visible"/>
+                                      </p:to>
+                                    </p:set>
+                                    <p:anim calcmode="lin" valueType="num">
+                                      <p:cBhvr>
+                                        <p:cTn id="29" dur="500" fill="hold"/>
+                                        <p:tgtEl>
+                                          <p:spTgt spid="17"/>
+                                        </p:tgtEl>
+                                        <p:attrNameLst>
+                                          <p:attrName>ppt_w</p:attrName>
+                                        </p:attrNameLst>
+                                      </p:cBhvr>
+                                      <p:tavLst>
+                                        <p:tav tm="0">
+                                          <p:val>
+                                            <p:fltVal val="0"/>
+                                          </p:val>
+                                        </p:tav>
+                                        <p:tav tm="100000">
+                                          <p:val>
+                                            <p:strVal val="#ppt_w"/>
+                                          </p:val>
+                                        </p:tav>
+                                      </p:tavLst>
+                                    </p:anim>
+                                    <p:anim calcmode="lin" valueType="num">
+                                      <p:cBhvr>
+                                        <p:cTn id="30" dur="500" fill="hold"/>
+                                        <p:tgtEl>
+                                          <p:spTgt spid="17"/>
+                                        </p:tgtEl>
+                                        <p:attrNameLst>
+                                          <p:attrName>ppt_h</p:attrName>
+                                        </p:attrNameLst>
+                                      </p:cBhvr>
+                                      <p:tavLst>
+                                        <p:tav tm="0">
+                                          <p:val>
+                                            <p:fltVal val="0"/>
+                                          </p:val>
+                                        </p:tav>
+                                        <p:tav tm="100000">
+                                          <p:val>
+                                            <p:strVal val="#ppt_h"/>
+                                          </p:val>
+                                        </p:tav>
+                                      </p:tavLst>
+                                    </p:anim>
+                                    <p:animEffect transition="in" filter="fade">
+                                      <p:cBhvr>
+                                        <p:cTn id="31" dur="500"/>
+                                        <p:tgtEl>
+                                          <p:spTgt spid="17"/>
+                                        </p:tgtEl>
+                                      </p:cBhvr>
+                                    </p:animEffect>
+                                  </p:childTnLst>
+                                </p:cTn>
+                              </p:par>
+                            </p:childTnLst>
+                          </p:cTn>
+                        </p:par>
+                        <p:par>
+                          <p:cTn id="32" fill="hold">
+                            <p:stCondLst>
+                              <p:cond delay="500"/>
+                            </p:stCondLst>
+                            <p:childTnLst>
+                              <p:par>
+                                <p:cTn id="33" presetID="22" presetClass="entr" presetSubtype="8" fill="hold" grpId="0" nodeType="afterEffect">
+                                  <p:stCondLst>
+                                    <p:cond delay="0"/>
+                                  </p:stCondLst>
+                                  <p:childTnLst>
+                                    <p:set>
+                                      <p:cBhvr>
+                                        <p:cTn id="34" dur="1" fill="hold">
+                                          <p:stCondLst>
+                                            <p:cond delay="0"/>
+                                          </p:stCondLst>
+                                        </p:cTn>
+                                        <p:tgtEl>
+                                          <p:spTgt spid="7">
+                                            <p:txEl>
+                                              <p:pRg st="2" end="2"/>
+                                            </p:txEl>
+                                          </p:spTgt>
+                                        </p:tgtEl>
+                                        <p:attrNameLst>
+                                          <p:attrName>style.visibility</p:attrName>
+                                        </p:attrNameLst>
+                                      </p:cBhvr>
+                                      <p:to>
+                                        <p:strVal val="visible"/>
+                                      </p:to>
+                                    </p:set>
+                                    <p:animEffect transition="in" filter="wipe(left)">
+                                      <p:cBhvr>
+                                        <p:cTn id="35" dur="500"/>
+                                        <p:tgtEl>
+                                          <p:spTgt spid="7">
+                                            <p:txEl>
+                                              <p:pRg st="2" end="2"/>
+                                            </p:txEl>
+                                          </p:spTgt>
+                                        </p:tgtEl>
+                                      </p:cBhvr>
+                                    </p:animEffect>
+                                  </p:childTnLst>
+                                </p:cTn>
+                              </p:par>
+                            </p:childTnLst>
+                          </p:cTn>
+                        </p:par>
+                      </p:childTnLst>
+                    </p:cTn>
+                  </p:par>
+                  <p:par>
+                    <p:cTn id="36" fill="hold">
+                      <p:stCondLst>
+                        <p:cond delay="indefinite"/>
+                      </p:stCondLst>
+                      <p:childTnLst>
+                        <p:par>
+                          <p:cTn id="37" fill="hold">
+                            <p:stCondLst>
+                              <p:cond delay="0"/>
+                            </p:stCondLst>
+                            <p:childTnLst>
+                              <p:par>
+                                <p:cTn id="38" presetID="53" presetClass="entr" presetSubtype="16" fill="hold" grpId="0" nodeType="clickEffect">
+                                  <p:stCondLst>
+                                    <p:cond delay="0"/>
+                                  </p:stCondLst>
+                                  <p:childTnLst>
+                                    <p:set>
+                                      <p:cBhvr>
+                                        <p:cTn id="39" dur="1" fill="hold">
+                                          <p:stCondLst>
+                                            <p:cond delay="0"/>
+                                          </p:stCondLst>
+                                        </p:cTn>
+                                        <p:tgtEl>
+                                          <p:spTgt spid="19"/>
+                                        </p:tgtEl>
+                                        <p:attrNameLst>
+                                          <p:attrName>style.visibility</p:attrName>
+                                        </p:attrNameLst>
+                                      </p:cBhvr>
+                                      <p:to>
+                                        <p:strVal val="visible"/>
+                                      </p:to>
+                                    </p:set>
+                                    <p:anim calcmode="lin" valueType="num">
+                                      <p:cBhvr>
+                                        <p:cTn id="40" dur="500" fill="hold"/>
+                                        <p:tgtEl>
+                                          <p:spTgt spid="19"/>
+                                        </p:tgtEl>
+                                        <p:attrNameLst>
+                                          <p:attrName>ppt_w</p:attrName>
+                                        </p:attrNameLst>
+                                      </p:cBhvr>
+                                      <p:tavLst>
+                                        <p:tav tm="0">
+                                          <p:val>
+                                            <p:fltVal val="0"/>
+                                          </p:val>
+                                        </p:tav>
+                                        <p:tav tm="100000">
+                                          <p:val>
+                                            <p:strVal val="#ppt_w"/>
+                                          </p:val>
+                                        </p:tav>
+                                      </p:tavLst>
+                                    </p:anim>
+                                    <p:anim calcmode="lin" valueType="num">
+                                      <p:cBhvr>
+                                        <p:cTn id="41" dur="500" fill="hold"/>
+                                        <p:tgtEl>
+                                          <p:spTgt spid="19"/>
+                                        </p:tgtEl>
+                                        <p:attrNameLst>
+                                          <p:attrName>ppt_h</p:attrName>
+                                        </p:attrNameLst>
+                                      </p:cBhvr>
+                                      <p:tavLst>
+                                        <p:tav tm="0">
+                                          <p:val>
+                                            <p:fltVal val="0"/>
+                                          </p:val>
+                                        </p:tav>
+                                        <p:tav tm="100000">
+                                          <p:val>
+                                            <p:strVal val="#ppt_h"/>
+                                          </p:val>
+                                        </p:tav>
+                                      </p:tavLst>
+                                    </p:anim>
+                                    <p:animEffect transition="in" filter="fade">
+                                      <p:cBhvr>
+                                        <p:cTn id="42" dur="500"/>
+                                        <p:tgtEl>
+                                          <p:spTgt spid="19"/>
+                                        </p:tgtEl>
+                                      </p:cBhvr>
+                                    </p:animEffect>
+                                  </p:childTnLst>
+                                </p:cTn>
+                              </p:par>
+                            </p:childTnLst>
+                          </p:cTn>
+                        </p:par>
+                        <p:par>
+                          <p:cTn id="43" fill="hold">
+                            <p:stCondLst>
+                              <p:cond delay="500"/>
+                            </p:stCondLst>
+                            <p:childTnLst>
+                              <p:par>
+                                <p:cTn id="44" presetID="22" presetClass="entr" presetSubtype="8" fill="hold" grpId="0" nodeType="afterEffect">
+                                  <p:stCondLst>
+                                    <p:cond delay="0"/>
+                                  </p:stCondLst>
+                                  <p:childTnLst>
+                                    <p:set>
+                                      <p:cBhvr>
+                                        <p:cTn id="45" dur="1" fill="hold">
+                                          <p:stCondLst>
+                                            <p:cond delay="0"/>
+                                          </p:stCondLst>
+                                        </p:cTn>
+                                        <p:tgtEl>
+                                          <p:spTgt spid="7">
+                                            <p:txEl>
+                                              <p:pRg st="3" end="3"/>
+                                            </p:txEl>
+                                          </p:spTgt>
+                                        </p:tgtEl>
+                                        <p:attrNameLst>
+                                          <p:attrName>style.visibility</p:attrName>
+                                        </p:attrNameLst>
+                                      </p:cBhvr>
+                                      <p:to>
+                                        <p:strVal val="visible"/>
+                                      </p:to>
+                                    </p:set>
+                                    <p:animEffect transition="in" filter="wipe(left)">
+                                      <p:cBhvr>
+                                        <p:cTn id="46" dur="500"/>
+                                        <p:tgtEl>
+                                          <p:spTgt spid="7">
+                                            <p:txEl>
+                                              <p:pRg st="3" end="3"/>
+                                            </p:txEl>
+                                          </p:spTgt>
+                                        </p:tgtEl>
+                                      </p:cBhvr>
+                                    </p:animEffect>
+                                  </p:childTnLst>
+                                </p:cTn>
+                              </p:par>
+                            </p:childTnLst>
+                          </p:cTn>
+                        </p:par>
+                      </p:childTnLst>
+                    </p:cTn>
+                  </p:par>
+                  <p:par>
+                    <p:cTn id="47" fill="hold">
+                      <p:stCondLst>
+                        <p:cond delay="indefinite"/>
+                      </p:stCondLst>
+                      <p:childTnLst>
+                        <p:par>
+                          <p:cTn id="48" fill="hold">
+                            <p:stCondLst>
+                              <p:cond delay="0"/>
+                            </p:stCondLst>
+                            <p:childTnLst>
+                              <p:par>
+                                <p:cTn id="49" presetID="53" presetClass="entr" presetSubtype="16" fill="hold" grpId="0" nodeType="clickEffect">
+                                  <p:stCondLst>
+                                    <p:cond delay="0"/>
+                                  </p:stCondLst>
+                                  <p:childTnLst>
+                                    <p:set>
+                                      <p:cBhvr>
+                                        <p:cTn id="50" dur="1" fill="hold">
+                                          <p:stCondLst>
+                                            <p:cond delay="0"/>
+                                          </p:stCondLst>
+                                        </p:cTn>
+                                        <p:tgtEl>
+                                          <p:spTgt spid="20"/>
+                                        </p:tgtEl>
+                                        <p:attrNameLst>
+                                          <p:attrName>style.visibility</p:attrName>
+                                        </p:attrNameLst>
+                                      </p:cBhvr>
+                                      <p:to>
+                                        <p:strVal val="visible"/>
+                                      </p:to>
+                                    </p:set>
+                                    <p:anim calcmode="lin" valueType="num">
+                                      <p:cBhvr>
+                                        <p:cTn id="51" dur="500" fill="hold"/>
+                                        <p:tgtEl>
+                                          <p:spTgt spid="20"/>
+                                        </p:tgtEl>
+                                        <p:attrNameLst>
+                                          <p:attrName>ppt_w</p:attrName>
+                                        </p:attrNameLst>
+                                      </p:cBhvr>
+                                      <p:tavLst>
+                                        <p:tav tm="0">
+                                          <p:val>
+                                            <p:fltVal val="0"/>
+                                          </p:val>
+                                        </p:tav>
+                                        <p:tav tm="100000">
+                                          <p:val>
+                                            <p:strVal val="#ppt_w"/>
+                                          </p:val>
+                                        </p:tav>
+                                      </p:tavLst>
+                                    </p:anim>
+                                    <p:anim calcmode="lin" valueType="num">
+                                      <p:cBhvr>
+                                        <p:cTn id="52" dur="500" fill="hold"/>
+                                        <p:tgtEl>
+                                          <p:spTgt spid="20"/>
+                                        </p:tgtEl>
+                                        <p:attrNameLst>
+                                          <p:attrName>ppt_h</p:attrName>
+                                        </p:attrNameLst>
+                                      </p:cBhvr>
+                                      <p:tavLst>
+                                        <p:tav tm="0">
+                                          <p:val>
+                                            <p:fltVal val="0"/>
+                                          </p:val>
+                                        </p:tav>
+                                        <p:tav tm="100000">
+                                          <p:val>
+                                            <p:strVal val="#ppt_h"/>
+                                          </p:val>
+                                        </p:tav>
+                                      </p:tavLst>
+                                    </p:anim>
+                                    <p:animEffect transition="in" filter="fade">
+                                      <p:cBhvr>
+                                        <p:cTn id="53" dur="500"/>
+                                        <p:tgtEl>
+                                          <p:spTgt spid="20"/>
+                                        </p:tgtEl>
+                                      </p:cBhvr>
+                                    </p:animEffect>
+                                  </p:childTnLst>
+                                </p:cTn>
+                              </p:par>
+                            </p:childTnLst>
+                          </p:cTn>
+                        </p:par>
+                        <p:par>
+                          <p:cTn id="54" fill="hold">
+                            <p:stCondLst>
+                              <p:cond delay="500"/>
+                            </p:stCondLst>
+                            <p:childTnLst>
+                              <p:par>
+                                <p:cTn id="55" presetID="22" presetClass="entr" presetSubtype="8" fill="hold" grpId="0" nodeType="afterEffect">
+                                  <p:stCondLst>
+                                    <p:cond delay="0"/>
+                                  </p:stCondLst>
+                                  <p:childTnLst>
+                                    <p:set>
+                                      <p:cBhvr>
+                                        <p:cTn id="56" dur="1" fill="hold">
+                                          <p:stCondLst>
+                                            <p:cond delay="0"/>
+                                          </p:stCondLst>
+                                        </p:cTn>
+                                        <p:tgtEl>
+                                          <p:spTgt spid="7">
+                                            <p:txEl>
+                                              <p:pRg st="4" end="4"/>
+                                            </p:txEl>
+                                          </p:spTgt>
+                                        </p:tgtEl>
+                                        <p:attrNameLst>
+                                          <p:attrName>style.visibility</p:attrName>
+                                        </p:attrNameLst>
+                                      </p:cBhvr>
+                                      <p:to>
+                                        <p:strVal val="visible"/>
+                                      </p:to>
+                                    </p:set>
+                                    <p:animEffect transition="in" filter="wipe(left)">
+                                      <p:cBhvr>
+                                        <p:cTn id="57" dur="500"/>
+                                        <p:tgtEl>
+                                          <p:spTgt spid="7">
+                                            <p:txEl>
+                                              <p:pRg st="4" end="4"/>
+                                            </p:txEl>
+                                          </p:spTgt>
+                                        </p:tgtEl>
+                                      </p:cBhvr>
+                                    </p:animEffect>
+                                  </p:childTnLst>
+                                </p:cTn>
+                              </p:par>
+                            </p:childTnLst>
+                          </p:cTn>
+                        </p:par>
+                      </p:childTnLst>
+                    </p:cTn>
+                  </p:par>
+                </p:childTnLst>
+              </p:cTn>
+              <p:prevCondLst>
+                <p:cond evt="onPrev" delay="0">
+                  <p:tgtEl>
+                    <p:sldTgt/>
+                  </p:tgtEl>
+                </p:cond>
+              </p:prevCondLst>
+              <p:nextCondLst>
+                <p:cond evt="onNext" delay="0">
+                  <p:tgtEl>
+                    <p:sldTgt/>
+                  </p:tgtEl>
+                </p:cond>
+              </p:nextCondLst>
+            </p:seq>
+          </p:childTnLst>
+        </p:cTn>
       </p:par>
     </p:tnLst>
+    <p:bldLst>
+      <p:bldP spid="5" grpId="0" animBg="1"/>
+      <p:bldP spid="16" grpId="0" animBg="1"/>
+      <p:bldP spid="17" grpId="0" animBg="1"/>
+      <p:bldP spid="19" grpId="0" animBg="1"/>
+      <p:bldP spid="20" grpId="0" animBg="1"/>
+      <p:bldP spid="7" grpId="0" uiExpand="1" build="p"/>
+    </p:bldLst>
   </p:timing>
 </p:sld>
 </file>

</xml_diff>